<commit_message>
Added cheat sheets, updated the presentation
</commit_message>
<xml_diff>
--- a/Presentation/slides.pptx
+++ b/Presentation/slides.pptx
@@ -6,7 +6,10 @@
   </p:sldMasterIdLst>
   <p:sldIdLst>
     <p:sldId id="256" r:id="rId2"/>
-    <p:sldId id="257" r:id="rId3"/>
+    <p:sldId id="258" r:id="rId3"/>
+    <p:sldId id="259" r:id="rId4"/>
+    <p:sldId id="257" r:id="rId5"/>
+    <p:sldId id="260" r:id="rId6"/>
   </p:sldIdLst>
   <p:sldSz cx="12192000" cy="6858000"/>
   <p:notesSz cx="6858000" cy="9144000"/>
@@ -105,6 +108,11 @@
       </a:defRPr>
     </a:lvl9pPr>
   </p:defaultTextStyle>
+  <p:extLst>
+    <p:ext uri="{EFAFB233-063F-42B5-8137-9DF3F51BA10A}">
+      <p15:sldGuideLst xmlns:p15="http://schemas.microsoft.com/office/powerpoint/2012/main"/>
+    </p:ext>
+  </p:extLst>
 </p:presentation>
 </file>
 
@@ -239,7 +247,7 @@
           <a:p>
             <a:fld id="{B8DB47C6-695A-4B79-BDE0-AF2E28EB5FB2}" type="datetimeFigureOut">
               <a:rPr lang="en-US" smtClean="0"/>
-              <a:t>5/1/2016</a:t>
+              <a:t>5/3/2016</a:t>
             </a:fld>
             <a:endParaRPr lang="en-US"/>
           </a:p>
@@ -409,7 +417,7 @@
           <a:p>
             <a:fld id="{B8DB47C6-695A-4B79-BDE0-AF2E28EB5FB2}" type="datetimeFigureOut">
               <a:rPr lang="en-US" smtClean="0"/>
-              <a:t>5/1/2016</a:t>
+              <a:t>5/3/2016</a:t>
             </a:fld>
             <a:endParaRPr lang="en-US"/>
           </a:p>
@@ -589,7 +597,7 @@
           <a:p>
             <a:fld id="{B8DB47C6-695A-4B79-BDE0-AF2E28EB5FB2}" type="datetimeFigureOut">
               <a:rPr lang="en-US" smtClean="0"/>
-              <a:t>5/1/2016</a:t>
+              <a:t>5/3/2016</a:t>
             </a:fld>
             <a:endParaRPr lang="en-US"/>
           </a:p>
@@ -759,7 +767,7 @@
           <a:p>
             <a:fld id="{B8DB47C6-695A-4B79-BDE0-AF2E28EB5FB2}" type="datetimeFigureOut">
               <a:rPr lang="en-US" smtClean="0"/>
-              <a:t>5/1/2016</a:t>
+              <a:t>5/3/2016</a:t>
             </a:fld>
             <a:endParaRPr lang="en-US"/>
           </a:p>
@@ -1005,7 +1013,7 @@
           <a:p>
             <a:fld id="{B8DB47C6-695A-4B79-BDE0-AF2E28EB5FB2}" type="datetimeFigureOut">
               <a:rPr lang="en-US" smtClean="0"/>
-              <a:t>5/1/2016</a:t>
+              <a:t>5/3/2016</a:t>
             </a:fld>
             <a:endParaRPr lang="en-US"/>
           </a:p>
@@ -1237,7 +1245,7 @@
           <a:p>
             <a:fld id="{B8DB47C6-695A-4B79-BDE0-AF2E28EB5FB2}" type="datetimeFigureOut">
               <a:rPr lang="en-US" smtClean="0"/>
-              <a:t>5/1/2016</a:t>
+              <a:t>5/3/2016</a:t>
             </a:fld>
             <a:endParaRPr lang="en-US"/>
           </a:p>
@@ -1604,7 +1612,7 @@
           <a:p>
             <a:fld id="{B8DB47C6-695A-4B79-BDE0-AF2E28EB5FB2}" type="datetimeFigureOut">
               <a:rPr lang="en-US" smtClean="0"/>
-              <a:t>5/1/2016</a:t>
+              <a:t>5/3/2016</a:t>
             </a:fld>
             <a:endParaRPr lang="en-US"/>
           </a:p>
@@ -1722,7 +1730,7 @@
           <a:p>
             <a:fld id="{B8DB47C6-695A-4B79-BDE0-AF2E28EB5FB2}" type="datetimeFigureOut">
               <a:rPr lang="en-US" smtClean="0"/>
-              <a:t>5/1/2016</a:t>
+              <a:t>5/3/2016</a:t>
             </a:fld>
             <a:endParaRPr lang="en-US"/>
           </a:p>
@@ -1817,7 +1825,7 @@
           <a:p>
             <a:fld id="{B8DB47C6-695A-4B79-BDE0-AF2E28EB5FB2}" type="datetimeFigureOut">
               <a:rPr lang="en-US" smtClean="0"/>
-              <a:t>5/1/2016</a:t>
+              <a:t>5/3/2016</a:t>
             </a:fld>
             <a:endParaRPr lang="en-US"/>
           </a:p>
@@ -2094,7 +2102,7 @@
           <a:p>
             <a:fld id="{B8DB47C6-695A-4B79-BDE0-AF2E28EB5FB2}" type="datetimeFigureOut">
               <a:rPr lang="en-US" smtClean="0"/>
-              <a:t>5/1/2016</a:t>
+              <a:t>5/3/2016</a:t>
             </a:fld>
             <a:endParaRPr lang="en-US"/>
           </a:p>
@@ -2347,7 +2355,7 @@
           <a:p>
             <a:fld id="{B8DB47C6-695A-4B79-BDE0-AF2E28EB5FB2}" type="datetimeFigureOut">
               <a:rPr lang="en-US" smtClean="0"/>
-              <a:t>5/1/2016</a:t>
+              <a:t>5/3/2016</a:t>
             </a:fld>
             <a:endParaRPr lang="en-US"/>
           </a:p>
@@ -2560,7 +2568,7 @@
           <a:p>
             <a:fld id="{B8DB47C6-695A-4B79-BDE0-AF2E28EB5FB2}" type="datetimeFigureOut">
               <a:rPr lang="en-US" smtClean="0"/>
-              <a:t>5/1/2016</a:t>
+              <a:t>5/3/2016</a:t>
             </a:fld>
             <a:endParaRPr lang="en-US"/>
           </a:p>
@@ -2980,7 +2988,11 @@
           <a:bodyPr/>
           <a:lstStyle/>
           <a:p>
-            <a:endParaRPr lang="en-US"/>
+            <a:r>
+              <a:rPr lang="en-US" dirty="0" smtClean="0"/>
+              <a:t>Python for Advanced Students</a:t>
+            </a:r>
+            <a:endParaRPr lang="en-US" dirty="0"/>
           </a:p>
         </p:txBody>
       </p:sp>
@@ -2999,7 +3011,11 @@
           <a:bodyPr/>
           <a:lstStyle/>
           <a:p>
-            <a:endParaRPr lang="en-US"/>
+            <a:r>
+              <a:rPr lang="en-US" dirty="0" smtClean="0"/>
+              <a:t>Using Python for challenges</a:t>
+            </a:r>
+            <a:endParaRPr lang="en-US" dirty="0"/>
           </a:p>
         </p:txBody>
       </p:sp>
@@ -3048,6 +3064,156 @@
           <a:bodyPr/>
           <a:lstStyle/>
           <a:p>
+            <a:endParaRPr lang="en-US"/>
+          </a:p>
+        </p:txBody>
+      </p:sp>
+      <p:pic>
+        <p:nvPicPr>
+          <p:cNvPr id="3" name="Picture 2"/>
+          <p:cNvPicPr>
+            <a:picLocks noChangeAspect="1"/>
+          </p:cNvPicPr>
+          <p:nvPr/>
+        </p:nvPicPr>
+        <p:blipFill>
+          <a:blip r:embed="rId2"/>
+          <a:stretch>
+            <a:fillRect/>
+          </a:stretch>
+        </p:blipFill>
+        <p:spPr>
+          <a:xfrm>
+            <a:off x="2449469" y="256274"/>
+            <a:ext cx="7029450" cy="6296025"/>
+          </a:xfrm>
+          <a:prstGeom prst="rect">
+            <a:avLst/>
+          </a:prstGeom>
+        </p:spPr>
+      </p:pic>
+    </p:spTree>
+    <p:extLst>
+      <p:ext uri="{BB962C8B-B14F-4D97-AF65-F5344CB8AC3E}">
+        <p14:creationId xmlns:p14="http://schemas.microsoft.com/office/powerpoint/2010/main" val="1359078134"/>
+      </p:ext>
+    </p:extLst>
+  </p:cSld>
+  <p:clrMapOvr>
+    <a:masterClrMapping/>
+  </p:clrMapOvr>
+</p:sld>
+</file>
+
+<file path=ppt/slides/slide3.xml><?xml version="1.0" encoding="utf-8"?>
+<p:sld xmlns:a="http://schemas.openxmlformats.org/drawingml/2006/main" xmlns:r="http://schemas.openxmlformats.org/officeDocument/2006/relationships" xmlns:p="http://schemas.openxmlformats.org/presentationml/2006/main">
+  <p:cSld>
+    <p:spTree>
+      <p:nvGrpSpPr>
+        <p:cNvPr id="1" name=""/>
+        <p:cNvGrpSpPr/>
+        <p:nvPr/>
+      </p:nvGrpSpPr>
+      <p:grpSpPr>
+        <a:xfrm>
+          <a:off x="0" y="0"/>
+          <a:ext cx="0" cy="0"/>
+          <a:chOff x="0" y="0"/>
+          <a:chExt cx="0" cy="0"/>
+        </a:xfrm>
+      </p:grpSpPr>
+      <p:sp>
+        <p:nvSpPr>
+          <p:cNvPr id="2" name="Title 1"/>
+          <p:cNvSpPr>
+            <a:spLocks noGrp="1"/>
+          </p:cNvSpPr>
+          <p:nvPr>
+            <p:ph type="title"/>
+          </p:nvPr>
+        </p:nvSpPr>
+        <p:spPr/>
+        <p:txBody>
+          <a:bodyPr/>
+          <a:lstStyle/>
+          <a:p>
+            <a:r>
+              <a:rPr lang="en-US" dirty="0" smtClean="0"/>
+              <a:t>Level 0</a:t>
+            </a:r>
+            <a:endParaRPr lang="en-US" dirty="0"/>
+          </a:p>
+        </p:txBody>
+      </p:sp>
+      <p:pic>
+        <p:nvPicPr>
+          <p:cNvPr id="3" name="Picture 2"/>
+          <p:cNvPicPr>
+            <a:picLocks noChangeAspect="1"/>
+          </p:cNvPicPr>
+          <p:nvPr/>
+        </p:nvPicPr>
+        <p:blipFill>
+          <a:blip r:embed="rId2"/>
+          <a:stretch>
+            <a:fillRect/>
+          </a:stretch>
+        </p:blipFill>
+        <p:spPr>
+          <a:xfrm>
+            <a:off x="4938970" y="1115583"/>
+            <a:ext cx="6334125" cy="5038725"/>
+          </a:xfrm>
+          <a:prstGeom prst="rect">
+            <a:avLst/>
+          </a:prstGeom>
+        </p:spPr>
+      </p:pic>
+    </p:spTree>
+    <p:extLst>
+      <p:ext uri="{BB962C8B-B14F-4D97-AF65-F5344CB8AC3E}">
+        <p14:creationId xmlns:p14="http://schemas.microsoft.com/office/powerpoint/2010/main" val="1589342808"/>
+      </p:ext>
+    </p:extLst>
+  </p:cSld>
+  <p:clrMapOvr>
+    <a:masterClrMapping/>
+  </p:clrMapOvr>
+</p:sld>
+</file>
+
+<file path=ppt/slides/slide4.xml><?xml version="1.0" encoding="utf-8"?>
+<p:sld xmlns:a="http://schemas.openxmlformats.org/drawingml/2006/main" xmlns:r="http://schemas.openxmlformats.org/officeDocument/2006/relationships" xmlns:p="http://schemas.openxmlformats.org/presentationml/2006/main">
+  <p:cSld>
+    <p:spTree>
+      <p:nvGrpSpPr>
+        <p:cNvPr id="1" name=""/>
+        <p:cNvGrpSpPr/>
+        <p:nvPr/>
+      </p:nvGrpSpPr>
+      <p:grpSpPr>
+        <a:xfrm>
+          <a:off x="0" y="0"/>
+          <a:ext cx="0" cy="0"/>
+          <a:chOff x="0" y="0"/>
+          <a:chExt cx="0" cy="0"/>
+        </a:xfrm>
+      </p:grpSpPr>
+      <p:sp>
+        <p:nvSpPr>
+          <p:cNvPr id="2" name="Title 1"/>
+          <p:cNvSpPr>
+            <a:spLocks noGrp="1"/>
+          </p:cNvSpPr>
+          <p:nvPr>
+            <p:ph type="title"/>
+          </p:nvPr>
+        </p:nvSpPr>
+        <p:spPr/>
+        <p:txBody>
+          <a:bodyPr/>
+          <a:lstStyle/>
+          <a:p>
             <a:r>
               <a:rPr lang="en-US" dirty="0" smtClean="0"/>
               <a:t>Python as a calculator</a:t>
@@ -3072,8 +3238,8 @@
         </p:blipFill>
         <p:spPr>
           <a:xfrm>
-            <a:off x="1200665" y="1913109"/>
-            <a:ext cx="2914650" cy="3019425"/>
+            <a:off x="1591962" y="1558882"/>
+            <a:ext cx="3626708" cy="3757080"/>
           </a:xfrm>
           <a:prstGeom prst="rect">
             <a:avLst/>
@@ -3084,6 +3250,88 @@
     <p:extLst>
       <p:ext uri="{BB962C8B-B14F-4D97-AF65-F5344CB8AC3E}">
         <p14:creationId xmlns:p14="http://schemas.microsoft.com/office/powerpoint/2010/main" val="2142168727"/>
+      </p:ext>
+    </p:extLst>
+  </p:cSld>
+  <p:clrMapOvr>
+    <a:masterClrMapping/>
+  </p:clrMapOvr>
+</p:sld>
+</file>
+
+<file path=ppt/slides/slide5.xml><?xml version="1.0" encoding="utf-8"?>
+<p:sld xmlns:a="http://schemas.openxmlformats.org/drawingml/2006/main" xmlns:r="http://schemas.openxmlformats.org/officeDocument/2006/relationships" xmlns:p="http://schemas.openxmlformats.org/presentationml/2006/main">
+  <p:cSld>
+    <p:spTree>
+      <p:nvGrpSpPr>
+        <p:cNvPr id="1" name=""/>
+        <p:cNvGrpSpPr/>
+        <p:nvPr/>
+      </p:nvGrpSpPr>
+      <p:grpSpPr>
+        <a:xfrm>
+          <a:off x="0" y="0"/>
+          <a:ext cx="0" cy="0"/>
+          <a:chOff x="0" y="0"/>
+          <a:chExt cx="0" cy="0"/>
+        </a:xfrm>
+      </p:grpSpPr>
+      <p:pic>
+        <p:nvPicPr>
+          <p:cNvPr id="3" name="Picture 2"/>
+          <p:cNvPicPr>
+            <a:picLocks noChangeAspect="1"/>
+          </p:cNvPicPr>
+          <p:nvPr/>
+        </p:nvPicPr>
+        <p:blipFill>
+          <a:blip r:embed="rId2"/>
+          <a:stretch>
+            <a:fillRect/>
+          </a:stretch>
+        </p:blipFill>
+        <p:spPr>
+          <a:xfrm>
+            <a:off x="1710124" y="365682"/>
+            <a:ext cx="9315450" cy="6200775"/>
+          </a:xfrm>
+          <a:prstGeom prst="rect">
+            <a:avLst/>
+          </a:prstGeom>
+        </p:spPr>
+      </p:pic>
+      <p:sp>
+        <p:nvSpPr>
+          <p:cNvPr id="4" name="Rectangle 3"/>
+          <p:cNvSpPr/>
+          <p:nvPr/>
+        </p:nvSpPr>
+        <p:spPr>
+          <a:xfrm>
+            <a:off x="9333486" y="181016"/>
+            <a:ext cx="2644314" cy="369332"/>
+          </a:xfrm>
+          <a:prstGeom prst="rect">
+            <a:avLst/>
+          </a:prstGeom>
+        </p:spPr>
+        <p:txBody>
+          <a:bodyPr wrap="none">
+            <a:spAutoFit/>
+          </a:bodyPr>
+          <a:lstStyle/>
+          <a:p>
+            <a:r>
+              <a:rPr lang="en-US" dirty="0"/>
+              <a:t>http://www.pyregex.com/</a:t>
+            </a:r>
+          </a:p>
+        </p:txBody>
+      </p:sp>
+    </p:spTree>
+    <p:extLst>
+      <p:ext uri="{BB962C8B-B14F-4D97-AF65-F5344CB8AC3E}">
+        <p14:creationId xmlns:p14="http://schemas.microsoft.com/office/powerpoint/2010/main" val="2430676935"/>
       </p:ext>
     </p:extLst>
   </p:cSld>

</xml_diff>